<commit_message>
import gif, date and time support, slice spacing bug fixed, ROI curves, mask data
</commit_message>
<xml_diff>
--- a/docs/Architecture.pptx
+++ b/docs/Architecture.pptx
@@ -272,7 +272,7 @@
           <a:p>
             <a:fld id="{E40BA643-7AC5-43F9-87E8-7DE05A620021}" type="datetimeFigureOut">
               <a:rPr lang="en-GB" smtClean="0"/>
-              <a:t>31/01/2023</a:t>
+              <a:t>09/03/2023</a:t>
             </a:fld>
             <a:endParaRPr lang="en-GB"/>
           </a:p>
@@ -472,7 +472,7 @@
           <a:p>
             <a:fld id="{E40BA643-7AC5-43F9-87E8-7DE05A620021}" type="datetimeFigureOut">
               <a:rPr lang="en-GB" smtClean="0"/>
-              <a:t>31/01/2023</a:t>
+              <a:t>09/03/2023</a:t>
             </a:fld>
             <a:endParaRPr lang="en-GB"/>
           </a:p>
@@ -682,7 +682,7 @@
           <a:p>
             <a:fld id="{E40BA643-7AC5-43F9-87E8-7DE05A620021}" type="datetimeFigureOut">
               <a:rPr lang="en-GB" smtClean="0"/>
-              <a:t>31/01/2023</a:t>
+              <a:t>09/03/2023</a:t>
             </a:fld>
             <a:endParaRPr lang="en-GB"/>
           </a:p>
@@ -882,7 +882,7 @@
           <a:p>
             <a:fld id="{E40BA643-7AC5-43F9-87E8-7DE05A620021}" type="datetimeFigureOut">
               <a:rPr lang="en-GB" smtClean="0"/>
-              <a:t>31/01/2023</a:t>
+              <a:t>09/03/2023</a:t>
             </a:fld>
             <a:endParaRPr lang="en-GB"/>
           </a:p>
@@ -1158,7 +1158,7 @@
           <a:p>
             <a:fld id="{E40BA643-7AC5-43F9-87E8-7DE05A620021}" type="datetimeFigureOut">
               <a:rPr lang="en-GB" smtClean="0"/>
-              <a:t>31/01/2023</a:t>
+              <a:t>09/03/2023</a:t>
             </a:fld>
             <a:endParaRPr lang="en-GB"/>
           </a:p>
@@ -1426,7 +1426,7 @@
           <a:p>
             <a:fld id="{E40BA643-7AC5-43F9-87E8-7DE05A620021}" type="datetimeFigureOut">
               <a:rPr lang="en-GB" smtClean="0"/>
-              <a:t>31/01/2023</a:t>
+              <a:t>09/03/2023</a:t>
             </a:fld>
             <a:endParaRPr lang="en-GB"/>
           </a:p>
@@ -1841,7 +1841,7 @@
           <a:p>
             <a:fld id="{E40BA643-7AC5-43F9-87E8-7DE05A620021}" type="datetimeFigureOut">
               <a:rPr lang="en-GB" smtClean="0"/>
-              <a:t>31/01/2023</a:t>
+              <a:t>09/03/2023</a:t>
             </a:fld>
             <a:endParaRPr lang="en-GB"/>
           </a:p>
@@ -1983,7 +1983,7 @@
           <a:p>
             <a:fld id="{E40BA643-7AC5-43F9-87E8-7DE05A620021}" type="datetimeFigureOut">
               <a:rPr lang="en-GB" smtClean="0"/>
-              <a:t>31/01/2023</a:t>
+              <a:t>09/03/2023</a:t>
             </a:fld>
             <a:endParaRPr lang="en-GB"/>
           </a:p>
@@ -2096,7 +2096,7 @@
           <a:p>
             <a:fld id="{E40BA643-7AC5-43F9-87E8-7DE05A620021}" type="datetimeFigureOut">
               <a:rPr lang="en-GB" smtClean="0"/>
-              <a:t>31/01/2023</a:t>
+              <a:t>09/03/2023</a:t>
             </a:fld>
             <a:endParaRPr lang="en-GB"/>
           </a:p>
@@ -2409,7 +2409,7 @@
           <a:p>
             <a:fld id="{E40BA643-7AC5-43F9-87E8-7DE05A620021}" type="datetimeFigureOut">
               <a:rPr lang="en-GB" smtClean="0"/>
-              <a:t>31/01/2023</a:t>
+              <a:t>09/03/2023</a:t>
             </a:fld>
             <a:endParaRPr lang="en-GB"/>
           </a:p>
@@ -2698,7 +2698,7 @@
           <a:p>
             <a:fld id="{E40BA643-7AC5-43F9-87E8-7DE05A620021}" type="datetimeFigureOut">
               <a:rPr lang="en-GB" smtClean="0"/>
-              <a:t>31/01/2023</a:t>
+              <a:t>09/03/2023</a:t>
             </a:fld>
             <a:endParaRPr lang="en-GB"/>
           </a:p>
@@ -2941,7 +2941,7 @@
           <a:p>
             <a:fld id="{E40BA643-7AC5-43F9-87E8-7DE05A620021}" type="datetimeFigureOut">
               <a:rPr lang="en-GB" smtClean="0"/>
-              <a:t>31/01/2023</a:t>
+              <a:t>09/03/2023</a:t>
             </a:fld>
             <a:endParaRPr lang="en-GB"/>
           </a:p>
@@ -3360,10 +3360,10 @@
       </p:grpSpPr>
       <p:sp>
         <p:nvSpPr>
-          <p:cNvPr id="4" name="Rectangle: Rounded Corners 3">
-            <a:extLst>
-              <a:ext uri="{FF2B5EF4-FFF2-40B4-BE49-F238E27FC236}">
-                <a16:creationId xmlns:a16="http://schemas.microsoft.com/office/drawing/2014/main" id="{0694E18F-F348-A09A-65BC-6A6806496FB8}"/>
+          <p:cNvPr id="51" name="Rectangle: Rounded Corners 50">
+            <a:extLst>
+              <a:ext uri="{FF2B5EF4-FFF2-40B4-BE49-F238E27FC236}">
+                <a16:creationId xmlns:a16="http://schemas.microsoft.com/office/drawing/2014/main" id="{D877B88E-A1BC-AF4D-F339-05C5D6229201}"/>
               </a:ext>
             </a:extLst>
           </p:cNvPr>
@@ -3372,7 +3372,115 @@
         </p:nvSpPr>
         <p:spPr>
           <a:xfrm>
-            <a:off x="4783318" y="306629"/>
+            <a:off x="2410233" y="81651"/>
+            <a:ext cx="3864072" cy="2849097"/>
+          </a:xfrm>
+          <a:prstGeom prst="roundRect">
+            <a:avLst>
+              <a:gd name="adj" fmla="val 3177"/>
+            </a:avLst>
+          </a:prstGeom>
+          <a:solidFill>
+            <a:schemeClr val="accent2">
+              <a:lumMod val="20000"/>
+              <a:lumOff val="80000"/>
+            </a:schemeClr>
+          </a:solidFill>
+        </p:spPr>
+        <p:style>
+          <a:lnRef idx="2">
+            <a:schemeClr val="accent1">
+              <a:shade val="50000"/>
+            </a:schemeClr>
+          </a:lnRef>
+          <a:fillRef idx="1">
+            <a:schemeClr val="accent1"/>
+          </a:fillRef>
+          <a:effectRef idx="0">
+            <a:schemeClr val="accent1"/>
+          </a:effectRef>
+          <a:fontRef idx="minor">
+            <a:schemeClr val="lt1"/>
+          </a:fontRef>
+        </p:style>
+        <p:txBody>
+          <a:bodyPr rtlCol="0" anchor="ctr"/>
+          <a:lstStyle/>
+          <a:p>
+            <a:pPr algn="ctr"/>
+            <a:endParaRPr lang="en-GB"/>
+          </a:p>
+        </p:txBody>
+      </p:sp>
+      <p:sp>
+        <p:nvSpPr>
+          <p:cNvPr id="50" name="Rectangle: Rounded Corners 49">
+            <a:extLst>
+              <a:ext uri="{FF2B5EF4-FFF2-40B4-BE49-F238E27FC236}">
+                <a16:creationId xmlns:a16="http://schemas.microsoft.com/office/drawing/2014/main" id="{75A899C4-F51A-95E4-D9C8-91FF6E3BB2E2}"/>
+              </a:ext>
+            </a:extLst>
+          </p:cNvPr>
+          <p:cNvSpPr/>
+          <p:nvPr/>
+        </p:nvSpPr>
+        <p:spPr>
+          <a:xfrm>
+            <a:off x="4717296" y="3137001"/>
+            <a:ext cx="7371290" cy="2659641"/>
+          </a:xfrm>
+          <a:prstGeom prst="roundRect">
+            <a:avLst>
+              <a:gd name="adj" fmla="val 3177"/>
+            </a:avLst>
+          </a:prstGeom>
+          <a:solidFill>
+            <a:schemeClr val="accent2">
+              <a:lumMod val="20000"/>
+              <a:lumOff val="80000"/>
+            </a:schemeClr>
+          </a:solidFill>
+        </p:spPr>
+        <p:style>
+          <a:lnRef idx="2">
+            <a:schemeClr val="accent1">
+              <a:shade val="50000"/>
+            </a:schemeClr>
+          </a:lnRef>
+          <a:fillRef idx="1">
+            <a:schemeClr val="accent1"/>
+          </a:fillRef>
+          <a:effectRef idx="0">
+            <a:schemeClr val="accent1"/>
+          </a:effectRef>
+          <a:fontRef idx="minor">
+            <a:schemeClr val="lt1"/>
+          </a:fontRef>
+        </p:style>
+        <p:txBody>
+          <a:bodyPr rtlCol="0" anchor="ctr"/>
+          <a:lstStyle/>
+          <a:p>
+            <a:pPr algn="ctr"/>
+            <a:endParaRPr lang="en-GB"/>
+          </a:p>
+        </p:txBody>
+      </p:sp>
+      <p:sp>
+        <p:nvSpPr>
+          <p:cNvPr id="4" name="Rectangle: Rounded Corners 3">
+            <a:extLst>
+              <a:ext uri="{FF2B5EF4-FFF2-40B4-BE49-F238E27FC236}">
+                <a16:creationId xmlns:a16="http://schemas.microsoft.com/office/drawing/2014/main" id="{0694E18F-F348-A09A-65BC-6A6806496FB8}"/>
+              </a:ext>
+            </a:extLst>
+          </p:cNvPr>
+          <p:cNvSpPr/>
+          <p:nvPr/>
+        </p:nvSpPr>
+        <p:spPr>
+          <a:xfrm>
+            <a:off x="7156403" y="277505"/>
             <a:ext cx="2625365" cy="834272"/>
           </a:xfrm>
           <a:prstGeom prst="roundRect">
@@ -3431,7 +3539,7 @@
         </p:nvSpPr>
         <p:spPr>
           <a:xfrm>
-            <a:off x="4783317" y="1887190"/>
+            <a:off x="7156402" y="1858066"/>
             <a:ext cx="2625365" cy="834272"/>
           </a:xfrm>
           <a:prstGeom prst="roundRect">
@@ -3493,7 +3601,7 @@
         </p:nvCxnSpPr>
         <p:spPr>
           <a:xfrm flipH="1">
-            <a:off x="6096000" y="1140901"/>
+            <a:off x="8469085" y="1111777"/>
             <a:ext cx="1" cy="746289"/>
           </a:xfrm>
           <a:prstGeom prst="straightConnector1">
@@ -3532,7 +3640,7 @@
         </p:nvSpPr>
         <p:spPr>
           <a:xfrm>
-            <a:off x="1419520" y="1887190"/>
+            <a:off x="388069" y="1830539"/>
             <a:ext cx="1671688" cy="834272"/>
           </a:xfrm>
           <a:prstGeom prst="roundRect">
@@ -3588,15 +3696,14 @@
           </p:cNvPr>
           <p:cNvCxnSpPr>
             <a:cxnSpLocks/>
-            <a:stCxn id="8" idx="3"/>
             <a:endCxn id="5" idx="1"/>
           </p:cNvCxnSpPr>
           <p:nvPr/>
         </p:nvCxnSpPr>
         <p:spPr>
           <a:xfrm>
-            <a:off x="3091208" y="2304326"/>
-            <a:ext cx="1692109" cy="0"/>
+            <a:off x="5638799" y="2275202"/>
+            <a:ext cx="1517603" cy="0"/>
           </a:xfrm>
           <a:prstGeom prst="straightConnector1">
             <a:avLst/>
@@ -3635,7 +3742,7 @@
         </p:nvSpPr>
         <p:spPr>
           <a:xfrm>
-            <a:off x="8668552" y="1887190"/>
+            <a:off x="3013434" y="1830539"/>
             <a:ext cx="2625365" cy="834272"/>
           </a:xfrm>
           <a:prstGeom prst="roundRect">
@@ -3670,6 +3777,22 @@
           <a:p>
             <a:pPr algn="ctr"/>
             <a:r>
+              <a:rPr lang="en-GB" dirty="0" err="1">
+                <a:solidFill>
+                  <a:sysClr val="windowText" lastClr="000000"/>
+                </a:solidFill>
+              </a:rPr>
+              <a:t>dbdicom</a:t>
+            </a:r>
+            <a:endParaRPr lang="en-GB" dirty="0">
+              <a:solidFill>
+                <a:sysClr val="windowText" lastClr="000000"/>
+              </a:solidFill>
+            </a:endParaRPr>
+          </a:p>
+          <a:p>
+            <a:pPr algn="ctr"/>
+            <a:r>
               <a:rPr lang="en-GB" dirty="0">
                 <a:solidFill>
                   <a:sysClr val="windowText" lastClr="000000"/>
@@ -3680,49 +3803,6 @@
           </a:p>
         </p:txBody>
       </p:sp>
-      <p:cxnSp>
-        <p:nvCxnSpPr>
-          <p:cNvPr id="13" name="Straight Arrow Connector 12">
-            <a:extLst>
-              <a:ext uri="{FF2B5EF4-FFF2-40B4-BE49-F238E27FC236}">
-                <a16:creationId xmlns:a16="http://schemas.microsoft.com/office/drawing/2014/main" id="{C6494329-F86F-CCF2-8BB9-0E39738494FE}"/>
-              </a:ext>
-            </a:extLst>
-          </p:cNvPr>
-          <p:cNvCxnSpPr>
-            <a:cxnSpLocks/>
-            <a:stCxn id="12" idx="1"/>
-            <a:endCxn id="5" idx="3"/>
-          </p:cNvCxnSpPr>
-          <p:nvPr/>
-        </p:nvCxnSpPr>
-        <p:spPr>
-          <a:xfrm flipH="1">
-            <a:off x="7408682" y="2304326"/>
-            <a:ext cx="1259870" cy="0"/>
-          </a:xfrm>
-          <a:prstGeom prst="straightConnector1">
-            <a:avLst/>
-          </a:prstGeom>
-          <a:ln w="38100">
-            <a:tailEnd type="triangle"/>
-          </a:ln>
-        </p:spPr>
-        <p:style>
-          <a:lnRef idx="1">
-            <a:schemeClr val="accent1"/>
-          </a:lnRef>
-          <a:fillRef idx="0">
-            <a:schemeClr val="accent1"/>
-          </a:fillRef>
-          <a:effectRef idx="0">
-            <a:schemeClr val="accent1"/>
-          </a:effectRef>
-          <a:fontRef idx="minor">
-            <a:schemeClr val="tx1"/>
-          </a:fontRef>
-        </p:style>
-      </p:cxnSp>
       <p:sp>
         <p:nvSpPr>
           <p:cNvPr id="16" name="Rectangle: Rounded Corners 15">
@@ -3737,7 +3817,7 @@
         </p:nvSpPr>
         <p:spPr>
           <a:xfrm>
-            <a:off x="4783317" y="3388041"/>
+            <a:off x="7156402" y="3358917"/>
             <a:ext cx="2625365" cy="834272"/>
           </a:xfrm>
           <a:prstGeom prst="roundRect">
@@ -3800,7 +3880,7 @@
         </p:nvCxnSpPr>
         <p:spPr>
           <a:xfrm>
-            <a:off x="6096000" y="2721462"/>
+            <a:off x="8469085" y="2692338"/>
             <a:ext cx="0" cy="666579"/>
           </a:xfrm>
           <a:prstGeom prst="straightConnector1">
@@ -3839,7 +3919,7 @@
         </p:nvSpPr>
         <p:spPr>
           <a:xfrm>
-            <a:off x="2516608" y="4807868"/>
+            <a:off x="4889693" y="4778744"/>
             <a:ext cx="1412998" cy="834272"/>
           </a:xfrm>
           <a:prstGeom prst="roundRect">
@@ -3879,7 +3959,7 @@
                   <a:sysClr val="windowText" lastClr="000000"/>
                 </a:solidFill>
               </a:rPr>
-              <a:t>Database</a:t>
+              <a:t>Series</a:t>
             </a:r>
           </a:p>
         </p:txBody>
@@ -3898,7 +3978,7 @@
         </p:nvSpPr>
         <p:spPr>
           <a:xfrm>
-            <a:off x="4399422" y="4807868"/>
+            <a:off x="6772507" y="4778744"/>
             <a:ext cx="1412998" cy="834272"/>
           </a:xfrm>
           <a:prstGeom prst="roundRect">
@@ -3938,7 +4018,7 @@
                   <a:sysClr val="windowText" lastClr="000000"/>
                 </a:solidFill>
               </a:rPr>
-              <a:t>Patient</a:t>
+              <a:t>Study</a:t>
             </a:r>
           </a:p>
         </p:txBody>
@@ -3957,7 +4037,7 @@
         </p:nvSpPr>
         <p:spPr>
           <a:xfrm>
-            <a:off x="6282236" y="4807868"/>
+            <a:off x="8655321" y="4778744"/>
             <a:ext cx="1412998" cy="834272"/>
           </a:xfrm>
           <a:prstGeom prst="roundRect">
@@ -3997,7 +4077,7 @@
                   <a:sysClr val="windowText" lastClr="000000"/>
                 </a:solidFill>
               </a:rPr>
-              <a:t>Study</a:t>
+              <a:t>Patient</a:t>
             </a:r>
           </a:p>
         </p:txBody>
@@ -4016,7 +4096,7 @@
         </p:nvSpPr>
         <p:spPr>
           <a:xfrm>
-            <a:off x="8112965" y="4807868"/>
+            <a:off x="10486050" y="4778744"/>
             <a:ext cx="1412998" cy="834272"/>
           </a:xfrm>
           <a:prstGeom prst="roundRect">
@@ -4056,7 +4136,7 @@
                   <a:sysClr val="windowText" lastClr="000000"/>
                 </a:solidFill>
               </a:rPr>
-              <a:t>Series</a:t>
+              <a:t>Database</a:t>
             </a:r>
           </a:p>
         </p:txBody>
@@ -4075,7 +4155,7 @@
         </p:nvSpPr>
         <p:spPr>
           <a:xfrm>
-            <a:off x="9981234" y="4807868"/>
+            <a:off x="2914580" y="4778743"/>
             <a:ext cx="1412998" cy="834272"/>
           </a:xfrm>
           <a:prstGeom prst="roundRect">
@@ -4118,6 +4198,17 @@
               <a:t>Instance</a:t>
             </a:r>
           </a:p>
+          <a:p>
+            <a:pPr algn="ctr"/>
+            <a:r>
+              <a:rPr lang="en-GB" dirty="0">
+                <a:solidFill>
+                  <a:sysClr val="windowText" lastClr="000000"/>
+                </a:solidFill>
+              </a:rPr>
+              <a:t>(deprecate)</a:t>
+            </a:r>
+          </a:p>
         </p:txBody>
       </p:sp>
       <p:sp>
@@ -4134,7 +4225,7 @@
         </p:nvSpPr>
         <p:spPr>
           <a:xfrm>
-            <a:off x="2551332" y="6140469"/>
+            <a:off x="4924417" y="6111345"/>
             <a:ext cx="7009355" cy="590309"/>
           </a:xfrm>
           <a:prstGeom prst="roundRect">
@@ -4197,7 +4288,7 @@
         </p:nvCxnSpPr>
         <p:spPr>
           <a:xfrm flipH="1">
-            <a:off x="3223107" y="4222313"/>
+            <a:off x="5596192" y="4193189"/>
             <a:ext cx="2872893" cy="585555"/>
           </a:xfrm>
           <a:prstGeom prst="straightConnector1">
@@ -4240,7 +4331,7 @@
         </p:nvCxnSpPr>
         <p:spPr>
           <a:xfrm flipH="1">
-            <a:off x="5105921" y="4222313"/>
+            <a:off x="7479006" y="4193189"/>
             <a:ext cx="990079" cy="585555"/>
           </a:xfrm>
           <a:prstGeom prst="straightConnector1">
@@ -4283,7 +4374,7 @@
         </p:nvCxnSpPr>
         <p:spPr>
           <a:xfrm>
-            <a:off x="6096000" y="4222313"/>
+            <a:off x="8469085" y="4193189"/>
             <a:ext cx="892735" cy="585555"/>
           </a:xfrm>
           <a:prstGeom prst="straightConnector1">
@@ -4326,51 +4417,8 @@
         </p:nvCxnSpPr>
         <p:spPr>
           <a:xfrm>
-            <a:off x="6096000" y="4222313"/>
+            <a:off x="8469085" y="4193189"/>
             <a:ext cx="2723464" cy="585555"/>
-          </a:xfrm>
-          <a:prstGeom prst="straightConnector1">
-            <a:avLst/>
-          </a:prstGeom>
-          <a:ln w="38100">
-            <a:tailEnd type="triangle"/>
-          </a:ln>
-        </p:spPr>
-        <p:style>
-          <a:lnRef idx="1">
-            <a:schemeClr val="accent1"/>
-          </a:lnRef>
-          <a:fillRef idx="0">
-            <a:schemeClr val="accent1"/>
-          </a:fillRef>
-          <a:effectRef idx="0">
-            <a:schemeClr val="accent1"/>
-          </a:effectRef>
-          <a:fontRef idx="minor">
-            <a:schemeClr val="tx1"/>
-          </a:fontRef>
-        </p:style>
-      </p:cxnSp>
-      <p:cxnSp>
-        <p:nvCxnSpPr>
-          <p:cNvPr id="38" name="Straight Arrow Connector 37">
-            <a:extLst>
-              <a:ext uri="{FF2B5EF4-FFF2-40B4-BE49-F238E27FC236}">
-                <a16:creationId xmlns:a16="http://schemas.microsoft.com/office/drawing/2014/main" id="{DA6694EE-69F9-D474-B972-965ED6BA45D2}"/>
-              </a:ext>
-            </a:extLst>
-          </p:cNvPr>
-          <p:cNvCxnSpPr>
-            <a:cxnSpLocks/>
-            <a:stCxn id="16" idx="2"/>
-            <a:endCxn id="24" idx="0"/>
-          </p:cNvCxnSpPr>
-          <p:nvPr/>
-        </p:nvCxnSpPr>
-        <p:spPr>
-          <a:xfrm>
-            <a:off x="6096000" y="4222313"/>
-            <a:ext cx="4591733" cy="585555"/>
           </a:xfrm>
           <a:prstGeom prst="straightConnector1">
             <a:avLst/>
@@ -4411,7 +4459,7 @@
         </p:nvCxnSpPr>
         <p:spPr>
           <a:xfrm>
-            <a:off x="3223107" y="5642140"/>
+            <a:off x="5596192" y="5613016"/>
             <a:ext cx="0" cy="498329"/>
           </a:xfrm>
           <a:prstGeom prst="straightConnector1">
@@ -4452,7 +4500,7 @@
         </p:nvCxnSpPr>
         <p:spPr>
           <a:xfrm>
-            <a:off x="5101620" y="5642139"/>
+            <a:off x="7474705" y="5613015"/>
             <a:ext cx="0" cy="498329"/>
           </a:xfrm>
           <a:prstGeom prst="straightConnector1">
@@ -4493,7 +4541,7 @@
         </p:nvCxnSpPr>
         <p:spPr>
           <a:xfrm>
-            <a:off x="6988735" y="5642139"/>
+            <a:off x="9361820" y="5613015"/>
             <a:ext cx="0" cy="498329"/>
           </a:xfrm>
           <a:prstGeom prst="straightConnector1">
@@ -4534,7 +4582,7 @@
         </p:nvCxnSpPr>
         <p:spPr>
           <a:xfrm>
-            <a:off x="8819464" y="5642139"/>
+            <a:off x="11192549" y="5613015"/>
             <a:ext cx="0" cy="498329"/>
           </a:xfrm>
           <a:prstGeom prst="straightConnector1">
@@ -4573,7 +4621,7 @@
         </p:nvSpPr>
         <p:spPr>
           <a:xfrm>
-            <a:off x="8285237" y="306629"/>
+            <a:off x="2608826" y="499263"/>
             <a:ext cx="1425922" cy="834272"/>
           </a:xfrm>
           <a:prstGeom prst="roundRect">
@@ -4613,7 +4661,7 @@
                   <a:sysClr val="windowText" lastClr="000000"/>
                 </a:solidFill>
               </a:rPr>
-              <a:t>pydicom</a:t>
+              <a:t>Pydicom</a:t>
             </a:r>
             <a:endParaRPr lang="en-GB" dirty="0">
               <a:solidFill>
@@ -4621,6 +4669,17 @@
               </a:solidFill>
             </a:endParaRPr>
           </a:p>
+          <a:p>
+            <a:pPr algn="ctr"/>
+            <a:r>
+              <a:rPr lang="en-GB" dirty="0">
+                <a:solidFill>
+                  <a:sysClr val="windowText" lastClr="000000"/>
+                </a:solidFill>
+              </a:rPr>
+              <a:t>dataset</a:t>
+            </a:r>
+          </a:p>
         </p:txBody>
       </p:sp>
       <p:sp>
@@ -4637,7 +4696,7 @@
         </p:nvSpPr>
         <p:spPr>
           <a:xfrm>
-            <a:off x="10237501" y="302493"/>
+            <a:off x="4495253" y="499263"/>
             <a:ext cx="1425922" cy="834272"/>
           </a:xfrm>
           <a:prstGeom prst="roundRect">
@@ -4677,13 +4736,24 @@
                   <a:sysClr val="windowText" lastClr="000000"/>
                 </a:solidFill>
               </a:rPr>
-              <a:t>highdicom</a:t>
+              <a:t>Highdicom</a:t>
             </a:r>
             <a:endParaRPr lang="en-GB" dirty="0">
               <a:solidFill>
                 <a:sysClr val="windowText" lastClr="000000"/>
               </a:solidFill>
             </a:endParaRPr>
+          </a:p>
+          <a:p>
+            <a:pPr algn="ctr"/>
+            <a:r>
+              <a:rPr lang="en-GB" dirty="0">
+                <a:solidFill>
+                  <a:sysClr val="windowText" lastClr="000000"/>
+                </a:solidFill>
+              </a:rPr>
+              <a:t>dataset</a:t>
+            </a:r>
           </a:p>
         </p:txBody>
       </p:sp>
@@ -4705,8 +4775,8 @@
         </p:nvCxnSpPr>
         <p:spPr>
           <a:xfrm>
-            <a:off x="8998198" y="1140901"/>
-            <a:ext cx="983037" cy="746289"/>
+            <a:off x="3321787" y="1333535"/>
+            <a:ext cx="1004330" cy="497004"/>
           </a:xfrm>
           <a:prstGeom prst="straightConnector1">
             <a:avLst/>
@@ -4748,51 +4818,8 @@
         </p:nvCxnSpPr>
         <p:spPr>
           <a:xfrm flipH="1">
-            <a:off x="9981235" y="1136765"/>
-            <a:ext cx="969227" cy="750425"/>
-          </a:xfrm>
-          <a:prstGeom prst="straightConnector1">
-            <a:avLst/>
-          </a:prstGeom>
-          <a:ln w="38100">
-            <a:tailEnd type="triangle"/>
-          </a:ln>
-        </p:spPr>
-        <p:style>
-          <a:lnRef idx="1">
-            <a:schemeClr val="accent1"/>
-          </a:lnRef>
-          <a:fillRef idx="0">
-            <a:schemeClr val="accent1"/>
-          </a:fillRef>
-          <a:effectRef idx="0">
-            <a:schemeClr val="accent1"/>
-          </a:effectRef>
-          <a:fontRef idx="minor">
-            <a:schemeClr val="tx1"/>
-          </a:fontRef>
-        </p:style>
-      </p:cxnSp>
-      <p:cxnSp>
-        <p:nvCxnSpPr>
-          <p:cNvPr id="55" name="Straight Arrow Connector 54">
-            <a:extLst>
-              <a:ext uri="{FF2B5EF4-FFF2-40B4-BE49-F238E27FC236}">
-                <a16:creationId xmlns:a16="http://schemas.microsoft.com/office/drawing/2014/main" id="{188160EF-1488-84A8-D4BC-827A00E16CF9}"/>
-              </a:ext>
-            </a:extLst>
-          </p:cNvPr>
-          <p:cNvCxnSpPr>
-            <a:cxnSpLocks/>
-            <a:stCxn id="12" idx="2"/>
-            <a:endCxn id="24" idx="0"/>
-          </p:cNvCxnSpPr>
-          <p:nvPr/>
-        </p:nvCxnSpPr>
-        <p:spPr>
-          <a:xfrm>
-            <a:off x="9981235" y="2721462"/>
-            <a:ext cx="706498" cy="2086406"/>
+            <a:off x="4326117" y="1333535"/>
+            <a:ext cx="882097" cy="497004"/>
           </a:xfrm>
           <a:prstGeom prst="straightConnector1">
             <a:avLst/>
@@ -4827,15 +4854,15 @@
           </p:cNvPr>
           <p:cNvCxnSpPr>
             <a:cxnSpLocks/>
-            <a:stCxn id="24" idx="2"/>
-            <a:endCxn id="25" idx="3"/>
+            <a:stCxn id="16" idx="2"/>
+            <a:endCxn id="24" idx="0"/>
           </p:cNvCxnSpPr>
           <p:nvPr/>
         </p:nvCxnSpPr>
         <p:spPr>
           <a:xfrm flipH="1">
-            <a:off x="9560687" y="5642140"/>
-            <a:ext cx="1127046" cy="793484"/>
+            <a:off x="3621079" y="4193189"/>
+            <a:ext cx="4848006" cy="585554"/>
           </a:xfrm>
           <a:prstGeom prst="straightConnector1">
             <a:avLst/>
@@ -4859,64 +4886,162 @@
           </a:fontRef>
         </p:style>
       </p:cxnSp>
-      <p:sp>
-        <p:nvSpPr>
-          <p:cNvPr id="61" name="&quot;Not Allowed&quot; Symbol 60">
-            <a:extLst>
-              <a:ext uri="{FF2B5EF4-FFF2-40B4-BE49-F238E27FC236}">
-                <a16:creationId xmlns:a16="http://schemas.microsoft.com/office/drawing/2014/main" id="{92E730AB-AFE5-5BF8-3CD2-8469E8B9E5CB}"/>
-              </a:ext>
-            </a:extLst>
-          </p:cNvPr>
-          <p:cNvSpPr/>
+      <p:cxnSp>
+        <p:nvCxnSpPr>
+          <p:cNvPr id="42" name="Straight Arrow Connector 41">
+            <a:extLst>
+              <a:ext uri="{FF2B5EF4-FFF2-40B4-BE49-F238E27FC236}">
+                <a16:creationId xmlns:a16="http://schemas.microsoft.com/office/drawing/2014/main" id="{01AFB231-DA73-E5EA-3094-003DD2C1E557}"/>
+              </a:ext>
+            </a:extLst>
+          </p:cNvPr>
+          <p:cNvCxnSpPr>
+            <a:cxnSpLocks/>
+            <a:endCxn id="12" idx="1"/>
+          </p:cNvCxnSpPr>
           <p:nvPr/>
-        </p:nvSpPr>
+        </p:nvCxnSpPr>
         <p:spPr>
           <a:xfrm>
-            <a:off x="10973683" y="4855319"/>
-            <a:ext cx="339522" cy="369685"/>
-          </a:xfrm>
-          <a:prstGeom prst="noSmoking">
+            <a:off x="2059757" y="2247675"/>
+            <a:ext cx="953677" cy="0"/>
+          </a:xfrm>
+          <a:prstGeom prst="straightConnector1">
             <a:avLst/>
           </a:prstGeom>
-          <a:solidFill>
-            <a:srgbClr val="FF0000"/>
-          </a:solidFill>
-          <a:ln>
-            <a:solidFill>
-              <a:srgbClr val="FF0000"/>
-            </a:solidFill>
+          <a:ln w="38100">
+            <a:headEnd type="triangle"/>
+            <a:tailEnd type="triangle"/>
           </a:ln>
         </p:spPr>
         <p:style>
-          <a:lnRef idx="2">
-            <a:schemeClr val="accent1">
-              <a:shade val="50000"/>
-            </a:schemeClr>
+          <a:lnRef idx="1">
+            <a:schemeClr val="accent1"/>
           </a:lnRef>
-          <a:fillRef idx="1">
+          <a:fillRef idx="0">
             <a:schemeClr val="accent1"/>
           </a:fillRef>
           <a:effectRef idx="0">
             <a:schemeClr val="accent1"/>
           </a:effectRef>
           <a:fontRef idx="minor">
-            <a:schemeClr val="lt1"/>
+            <a:schemeClr val="tx1"/>
           </a:fontRef>
         </p:style>
-        <p:txBody>
-          <a:bodyPr rtlCol="0" anchor="ctr"/>
-          <a:lstStyle/>
-          <a:p>
-            <a:pPr algn="ctr"/>
-            <a:endParaRPr lang="en-GB">
-              <a:solidFill>
-                <a:schemeClr val="tx1"/>
-              </a:solidFill>
-            </a:endParaRPr>
-          </a:p>
-        </p:txBody>
-      </p:sp>
+      </p:cxnSp>
+      <p:sp>
+        <p:nvSpPr>
+          <p:cNvPr id="53" name="TextBox 52">
+            <a:extLst>
+              <a:ext uri="{FF2B5EF4-FFF2-40B4-BE49-F238E27FC236}">
+                <a16:creationId xmlns:a16="http://schemas.microsoft.com/office/drawing/2014/main" id="{2CF81A74-9776-B9ED-E1A8-C87751B95407}"/>
+              </a:ext>
+            </a:extLst>
+          </p:cNvPr>
+          <p:cNvSpPr txBox="1"/>
+          <p:nvPr/>
+        </p:nvSpPr>
+        <p:spPr>
+          <a:xfrm>
+            <a:off x="2472823" y="65857"/>
+            <a:ext cx="2117271" cy="369332"/>
+          </a:xfrm>
+          <a:prstGeom prst="rect">
+            <a:avLst/>
+          </a:prstGeom>
+          <a:noFill/>
+        </p:spPr>
+        <p:txBody>
+          <a:bodyPr wrap="square" rtlCol="0">
+            <a:spAutoFit/>
+          </a:bodyPr>
+          <a:lstStyle/>
+          <a:p>
+            <a:r>
+              <a:rPr lang="en-GB" dirty="0"/>
+              <a:t>Read/write</a:t>
+            </a:r>
+          </a:p>
+        </p:txBody>
+      </p:sp>
+      <p:sp>
+        <p:nvSpPr>
+          <p:cNvPr id="54" name="TextBox 53">
+            <a:extLst>
+              <a:ext uri="{FF2B5EF4-FFF2-40B4-BE49-F238E27FC236}">
+                <a16:creationId xmlns:a16="http://schemas.microsoft.com/office/drawing/2014/main" id="{C0753C09-DD7C-1C2E-6CF4-458A14DBDB86}"/>
+              </a:ext>
+            </a:extLst>
+          </p:cNvPr>
+          <p:cNvSpPr txBox="1"/>
+          <p:nvPr/>
+        </p:nvSpPr>
+        <p:spPr>
+          <a:xfrm>
+            <a:off x="4821715" y="3190745"/>
+            <a:ext cx="2117271" cy="369332"/>
+          </a:xfrm>
+          <a:prstGeom prst="rect">
+            <a:avLst/>
+          </a:prstGeom>
+          <a:noFill/>
+        </p:spPr>
+        <p:txBody>
+          <a:bodyPr wrap="square" rtlCol="0">
+            <a:spAutoFit/>
+          </a:bodyPr>
+          <a:lstStyle/>
+          <a:p>
+            <a:r>
+              <a:rPr lang="en-GB" dirty="0"/>
+              <a:t>User interface</a:t>
+            </a:r>
+          </a:p>
+        </p:txBody>
+      </p:sp>
+      <p:cxnSp>
+        <p:nvCxnSpPr>
+          <p:cNvPr id="56" name="Straight Arrow Connector 55">
+            <a:extLst>
+              <a:ext uri="{FF2B5EF4-FFF2-40B4-BE49-F238E27FC236}">
+                <a16:creationId xmlns:a16="http://schemas.microsoft.com/office/drawing/2014/main" id="{BB8DC7A1-D884-D2D2-D690-46521A3D8EC6}"/>
+              </a:ext>
+            </a:extLst>
+          </p:cNvPr>
+          <p:cNvCxnSpPr>
+            <a:cxnSpLocks/>
+            <a:stCxn id="47" idx="3"/>
+            <a:endCxn id="48" idx="1"/>
+          </p:cNvCxnSpPr>
+          <p:nvPr/>
+        </p:nvCxnSpPr>
+        <p:spPr>
+          <a:xfrm>
+            <a:off x="4034748" y="916399"/>
+            <a:ext cx="460505" cy="0"/>
+          </a:xfrm>
+          <a:prstGeom prst="straightConnector1">
+            <a:avLst/>
+          </a:prstGeom>
+          <a:ln w="38100">
+            <a:tailEnd type="triangle"/>
+          </a:ln>
+        </p:spPr>
+        <p:style>
+          <a:lnRef idx="1">
+            <a:schemeClr val="accent1"/>
+          </a:lnRef>
+          <a:fillRef idx="0">
+            <a:schemeClr val="accent1"/>
+          </a:fillRef>
+          <a:effectRef idx="0">
+            <a:schemeClr val="accent1"/>
+          </a:effectRef>
+          <a:fontRef idx="minor">
+            <a:schemeClr val="tx1"/>
+          </a:fontRef>
+        </p:style>
+      </p:cxnSp>
     </p:spTree>
     <p:extLst>
       <p:ext uri="{BB962C8B-B14F-4D97-AF65-F5344CB8AC3E}">

</xml_diff>